<commit_message>
new charts with per inhabitant info
</commit_message>
<xml_diff>
--- a/Criminal Incidents in Austin, TX.pptx
+++ b/Criminal Incidents in Austin, TX.pptx
@@ -12,12 +12,17 @@
     <p:sldId id="260" r:id="rId6"/>
     <p:sldId id="261" r:id="rId7"/>
     <p:sldId id="265" r:id="rId8"/>
-    <p:sldId id="266" r:id="rId9"/>
-    <p:sldId id="267" r:id="rId10"/>
-    <p:sldId id="262" r:id="rId11"/>
-    <p:sldId id="263" r:id="rId12"/>
-    <p:sldId id="264" r:id="rId13"/>
-    <p:sldId id="268" r:id="rId14"/>
+    <p:sldId id="269" r:id="rId9"/>
+    <p:sldId id="266" r:id="rId10"/>
+    <p:sldId id="270" r:id="rId11"/>
+    <p:sldId id="267" r:id="rId12"/>
+    <p:sldId id="271" r:id="rId13"/>
+    <p:sldId id="262" r:id="rId14"/>
+    <p:sldId id="263" r:id="rId15"/>
+    <p:sldId id="264" r:id="rId16"/>
+    <p:sldId id="272" r:id="rId17"/>
+    <p:sldId id="273" r:id="rId18"/>
+    <p:sldId id="268" r:id="rId19"/>
   </p:sldIdLst>
   <p:sldSz cx="12192000" cy="6858000"/>
   <p:notesSz cx="6858000" cy="9144000"/>
@@ -2068,10 +2073,10 @@
       </p:grpSpPr>
       <p:sp>
         <p:nvSpPr>
-          <p:cNvPr id="3" name="Title 2">
+          <p:cNvPr id="4" name="Title 3">
             <a:extLst>
               <a:ext uri="{FF2B5EF4-FFF2-40B4-BE49-F238E27FC236}">
-                <a16:creationId xmlns:a16="http://schemas.microsoft.com/office/drawing/2014/main" id="{170627F4-0651-437F-8C40-B4A905D23F20}"/>
+                <a16:creationId xmlns:a16="http://schemas.microsoft.com/office/drawing/2014/main" id="{AE0C0E30-55D9-4A01-B57B-585CEBD419D5}"/>
               </a:ext>
             </a:extLst>
           </p:cNvPr>
@@ -2085,169 +2090,64 @@
         <p:spPr>
           <a:xfrm>
             <a:off x="1933596" y="371207"/>
-            <a:ext cx="8324808" cy="984885"/>
+            <a:ext cx="8324808" cy="369332"/>
           </a:xfrm>
         </p:spPr>
         <p:txBody>
           <a:bodyPr/>
           <a:lstStyle/>
           <a:p>
-            <a:pPr algn="ctr"/>
-            <a:r>
-              <a:rPr lang="en-US" sz="3200" dirty="0">
+            <a:r>
+              <a:rPr lang="en-US" sz="2400" dirty="0">
                 <a:latin typeface="Arial" panose="020B0604020202020204" pitchFamily="34" charset="0"/>
                 <a:cs typeface="Arial" panose="020B0604020202020204" pitchFamily="34" charset="0"/>
               </a:rPr>
-              <a:t>APD Crime Analysis Unit Districts (Sectors)</a:t>
-            </a:r>
-          </a:p>
-        </p:txBody>
-      </p:sp>
-      <p:sp>
-        <p:nvSpPr>
-          <p:cNvPr id="4" name="Text Placeholder 3">
+              <a:t>Crime Incidents by Month per 100,000 Inhabitants 2015</a:t>
+            </a:r>
+            <a:endParaRPr lang="en-US" sz="2400" dirty="0"/>
+          </a:p>
+        </p:txBody>
+      </p:sp>
+      <p:pic>
+        <p:nvPicPr>
+          <p:cNvPr id="7" name="Picture 6">
             <a:extLst>
               <a:ext uri="{FF2B5EF4-FFF2-40B4-BE49-F238E27FC236}">
-                <a16:creationId xmlns:a16="http://schemas.microsoft.com/office/drawing/2014/main" id="{871EA759-00CD-42CC-9458-796A844B6AB7}"/>
+                <a16:creationId xmlns:a16="http://schemas.microsoft.com/office/drawing/2014/main" id="{EC878D29-D0DA-473E-9218-CF7D25111793}"/>
               </a:ext>
             </a:extLst>
           </p:cNvPr>
-          <p:cNvSpPr>
-            <a:spLocks noGrp="1"/>
-          </p:cNvSpPr>
-          <p:nvPr>
-            <p:ph type="body" idx="1"/>
-          </p:nvPr>
-        </p:nvSpPr>
-        <p:spPr>
-          <a:xfrm>
-            <a:off x="439606" y="1667020"/>
-            <a:ext cx="11115837" cy="3754874"/>
-          </a:xfrm>
-        </p:spPr>
-        <p:txBody>
-          <a:bodyPr/>
-          <a:lstStyle/>
-          <a:p>
-            <a:pPr algn="ctr"/>
-            <a:r>
-              <a:rPr lang="en-US" sz="2400" b="1" u="sng" dirty="0"/>
-              <a:t>Austin, TX is divided into 10 Sectors</a:t>
-            </a:r>
-          </a:p>
-          <a:p>
-            <a:pPr marL="342900" indent="-342900" algn="ctr">
-              <a:buFont typeface="Arial" panose="020B0604020202020204" pitchFamily="34" charset="0"/>
-              <a:buChar char="•"/>
-            </a:pPr>
-            <a:r>
-              <a:rPr lang="en-US" sz="2000" dirty="0"/>
-              <a:t>A – Adam</a:t>
-            </a:r>
-          </a:p>
-          <a:p>
-            <a:pPr marL="342900" indent="-342900" algn="ctr">
-              <a:buFont typeface="Arial" panose="020B0604020202020204" pitchFamily="34" charset="0"/>
-              <a:buChar char="•"/>
-            </a:pPr>
-            <a:r>
-              <a:rPr lang="en-US" sz="2000" dirty="0"/>
-              <a:t>AP - Airport</a:t>
-            </a:r>
-          </a:p>
-          <a:p>
-            <a:pPr marL="342900" indent="-342900" algn="ctr">
-              <a:buFont typeface="Arial" panose="020B0604020202020204" pitchFamily="34" charset="0"/>
-              <a:buChar char="•"/>
-            </a:pPr>
-            <a:r>
-              <a:rPr lang="en-US" sz="2000" dirty="0"/>
-              <a:t>B – Baker</a:t>
-            </a:r>
-          </a:p>
-          <a:p>
-            <a:pPr marL="342900" indent="-342900" algn="ctr">
-              <a:buFont typeface="Arial" panose="020B0604020202020204" pitchFamily="34" charset="0"/>
-              <a:buChar char="•"/>
-            </a:pPr>
-            <a:r>
-              <a:rPr lang="en-US" sz="2000" dirty="0"/>
-              <a:t>C –  Charlie</a:t>
-            </a:r>
-          </a:p>
-          <a:p>
-            <a:pPr marL="342900" indent="-342900" algn="ctr">
-              <a:buFont typeface="Arial" panose="020B0604020202020204" pitchFamily="34" charset="0"/>
-              <a:buChar char="•"/>
-            </a:pPr>
-            <a:r>
-              <a:rPr lang="en-US" sz="2000" dirty="0"/>
-              <a:t>D –  David</a:t>
-            </a:r>
-          </a:p>
-          <a:p>
-            <a:pPr marL="342900" indent="-342900" algn="ctr">
-              <a:buFont typeface="Arial" panose="020B0604020202020204" pitchFamily="34" charset="0"/>
-              <a:buChar char="•"/>
-            </a:pPr>
-            <a:r>
-              <a:rPr lang="en-US" sz="2000" dirty="0"/>
-              <a:t>E –  Edward</a:t>
-            </a:r>
-          </a:p>
-          <a:p>
-            <a:pPr marL="342900" indent="-342900" algn="ctr">
-              <a:buFont typeface="Arial" panose="020B0604020202020204" pitchFamily="34" charset="0"/>
-              <a:buChar char="•"/>
-            </a:pPr>
-            <a:r>
-              <a:rPr lang="en-US" sz="2000" dirty="0"/>
-              <a:t>F – Frank</a:t>
-            </a:r>
-          </a:p>
-          <a:p>
-            <a:pPr marL="342900" indent="-342900" algn="ctr">
-              <a:buFont typeface="Arial" panose="020B0604020202020204" pitchFamily="34" charset="0"/>
-              <a:buChar char="•"/>
-            </a:pPr>
-            <a:r>
-              <a:rPr lang="en-US" sz="2000" dirty="0"/>
-              <a:t>G – George</a:t>
-            </a:r>
-          </a:p>
-          <a:p>
-            <a:pPr marL="342900" indent="-342900" algn="ctr">
-              <a:buFont typeface="Arial" panose="020B0604020202020204" pitchFamily="34" charset="0"/>
-              <a:buChar char="•"/>
-            </a:pPr>
-            <a:r>
-              <a:rPr lang="en-US" sz="2000" dirty="0"/>
-              <a:t>H –  Henry</a:t>
-            </a:r>
-          </a:p>
-          <a:p>
-            <a:pPr marL="342900" indent="-342900" algn="ctr">
-              <a:buFont typeface="Arial" panose="020B0604020202020204" pitchFamily="34" charset="0"/>
-              <a:buChar char="•"/>
-            </a:pPr>
-            <a:r>
-              <a:rPr lang="en-US" sz="2000" dirty="0"/>
-              <a:t>I – IDA</a:t>
-            </a:r>
-          </a:p>
-          <a:p>
-            <a:pPr marL="342900" indent="-342900" algn="l">
-              <a:buFont typeface="Arial" panose="020B0604020202020204" pitchFamily="34" charset="0"/>
-              <a:buChar char="•"/>
-            </a:pPr>
-            <a:endParaRPr lang="en-US" sz="2000" dirty="0"/>
-          </a:p>
-        </p:txBody>
-      </p:sp>
+          <p:cNvPicPr>
+            <a:picLocks noChangeAspect="1"/>
+          </p:cNvPicPr>
+          <p:nvPr/>
+        </p:nvPicPr>
+        <p:blipFill>
+          <a:blip r:embed="rId2">
+            <a:extLst>
+              <a:ext uri="{28A0092B-C50C-407E-A947-70E740481C1C}">
+                <a14:useLocalDpi xmlns:a14="http://schemas.microsoft.com/office/drawing/2010/main" val="0"/>
+              </a:ext>
+            </a:extLst>
+          </a:blip>
+          <a:stretch>
+            <a:fillRect/>
+          </a:stretch>
+        </p:blipFill>
+        <p:spPr>
+          <a:xfrm>
+            <a:off x="1586702" y="740539"/>
+            <a:ext cx="9389656" cy="5809496"/>
+          </a:xfrm>
+          <a:prstGeom prst="rect">
+            <a:avLst/>
+          </a:prstGeom>
+        </p:spPr>
+      </p:pic>
     </p:spTree>
     <p:extLst>
       <p:ext uri="{BB962C8B-B14F-4D97-AF65-F5344CB8AC3E}">
-        <p14:creationId xmlns:p14="http://schemas.microsoft.com/office/powerpoint/2010/main" val="4092120976"/>
+        <p14:creationId xmlns:p14="http://schemas.microsoft.com/office/powerpoint/2010/main" val="2812511984"/>
       </p:ext>
     </p:extLst>
   </p:cSld>
@@ -2274,12 +2174,49 @@
           <a:chExt cx="0" cy="0"/>
         </a:xfrm>
       </p:grpSpPr>
+      <p:sp>
+        <p:nvSpPr>
+          <p:cNvPr id="2" name="Title 1">
+            <a:extLst>
+              <a:ext uri="{FF2B5EF4-FFF2-40B4-BE49-F238E27FC236}">
+                <a16:creationId xmlns:a16="http://schemas.microsoft.com/office/drawing/2014/main" id="{BCC68EBE-2ABA-4657-AB0E-302D1046CC9B}"/>
+              </a:ext>
+            </a:extLst>
+          </p:cNvPr>
+          <p:cNvSpPr>
+            <a:spLocks noGrp="1"/>
+          </p:cNvSpPr>
+          <p:nvPr>
+            <p:ph type="title"/>
+          </p:nvPr>
+        </p:nvSpPr>
+        <p:spPr>
+          <a:xfrm>
+            <a:off x="250570" y="331451"/>
+            <a:ext cx="8324808" cy="276999"/>
+          </a:xfrm>
+        </p:spPr>
+        <p:txBody>
+          <a:bodyPr/>
+          <a:lstStyle/>
+          <a:p>
+            <a:r>
+              <a:rPr lang="en-US" sz="1800" dirty="0">
+                <a:latin typeface="Arial" panose="020B0604020202020204" pitchFamily="34" charset="0"/>
+                <a:cs typeface="Arial" panose="020B0604020202020204" pitchFamily="34" charset="0"/>
+              </a:rPr>
+              <a:t>Crime Incidents by Month 2016</a:t>
+            </a:r>
+            <a:endParaRPr lang="en-US" sz="1800" dirty="0"/>
+          </a:p>
+        </p:txBody>
+      </p:sp>
       <p:pic>
         <p:nvPicPr>
-          <p:cNvPr id="3" name="Picture 2">
+          <p:cNvPr id="4" name="Picture 3">
             <a:extLst>
               <a:ext uri="{FF2B5EF4-FFF2-40B4-BE49-F238E27FC236}">
-                <a16:creationId xmlns:a16="http://schemas.microsoft.com/office/drawing/2014/main" id="{9B8C41E2-75D1-41A8-B1B5-FFAFDE59C0D2}"/>
+                <a16:creationId xmlns:a16="http://schemas.microsoft.com/office/drawing/2014/main" id="{7AE8BA13-F6A7-4D84-BA52-6CC32B78F0EB}"/>
               </a:ext>
             </a:extLst>
           </p:cNvPr>
@@ -2302,8 +2239,8 @@
         </p:blipFill>
         <p:spPr>
           <a:xfrm>
-            <a:off x="3057378" y="251150"/>
-            <a:ext cx="6227299" cy="6206153"/>
+            <a:off x="1092072" y="399830"/>
+            <a:ext cx="9059094" cy="6126719"/>
           </a:xfrm>
           <a:prstGeom prst="rect">
             <a:avLst/>
@@ -2313,7 +2250,7 @@
     </p:spTree>
     <p:extLst>
       <p:ext uri="{BB962C8B-B14F-4D97-AF65-F5344CB8AC3E}">
-        <p14:creationId xmlns:p14="http://schemas.microsoft.com/office/powerpoint/2010/main" val="2855204370"/>
+        <p14:creationId xmlns:p14="http://schemas.microsoft.com/office/powerpoint/2010/main" val="55347818"/>
       </p:ext>
     </p:extLst>
   </p:cSld>
@@ -2345,7 +2282,7 @@
           <p:cNvPr id="4" name="Title 3">
             <a:extLst>
               <a:ext uri="{FF2B5EF4-FFF2-40B4-BE49-F238E27FC236}">
-                <a16:creationId xmlns:a16="http://schemas.microsoft.com/office/drawing/2014/main" id="{98CED353-7F47-4A61-A462-02BC0D9CFF07}"/>
+                <a16:creationId xmlns:a16="http://schemas.microsoft.com/office/drawing/2014/main" id="{A1872078-F0D6-4DA8-97C1-0D34AE0B4958}"/>
               </a:ext>
             </a:extLst>
           </p:cNvPr>
@@ -2359,43 +2296,30 @@
         <p:spPr>
           <a:xfrm>
             <a:off x="1933596" y="371207"/>
-            <a:ext cx="8324808" cy="861774"/>
+            <a:ext cx="8324808" cy="369332"/>
           </a:xfrm>
         </p:spPr>
         <p:txBody>
           <a:bodyPr/>
           <a:lstStyle/>
           <a:p>
-            <a:pPr algn="ctr"/>
-            <a:r>
-              <a:rPr lang="en-US" sz="2800" dirty="0">
+            <a:r>
+              <a:rPr lang="en-US" sz="2400" dirty="0">
                 <a:latin typeface="Arial" panose="020B0604020202020204" pitchFamily="34" charset="0"/>
                 <a:cs typeface="Arial" panose="020B0604020202020204" pitchFamily="34" charset="0"/>
               </a:rPr>
-              <a:t>INCIDENTS BASED ON DISTRICT</a:t>
-            </a:r>
-            <a:br>
-              <a:rPr lang="en-US" sz="2800" dirty="0">
-                <a:latin typeface="Arial" panose="020B0604020202020204" pitchFamily="34" charset="0"/>
-                <a:cs typeface="Arial" panose="020B0604020202020204" pitchFamily="34" charset="0"/>
-              </a:rPr>
-            </a:br>
-            <a:r>
-              <a:rPr lang="en-US" sz="2800" dirty="0">
-                <a:latin typeface="Arial" panose="020B0604020202020204" pitchFamily="34" charset="0"/>
-                <a:cs typeface="Arial" panose="020B0604020202020204" pitchFamily="34" charset="0"/>
-              </a:rPr>
-              <a:t>2014-2016</a:t>
-            </a:r>
+              <a:t>Crime Incidents by Month per 100,000 Inhabitants 2016</a:t>
+            </a:r>
+            <a:endParaRPr lang="en-US" sz="2400" dirty="0"/>
           </a:p>
         </p:txBody>
       </p:sp>
       <p:pic>
         <p:nvPicPr>
-          <p:cNvPr id="6" name="Picture 5">
+          <p:cNvPr id="7" name="Picture 6">
             <a:extLst>
               <a:ext uri="{FF2B5EF4-FFF2-40B4-BE49-F238E27FC236}">
-                <a16:creationId xmlns:a16="http://schemas.microsoft.com/office/drawing/2014/main" id="{948277E0-F29F-48D9-85B9-683E9B7FF851}"/>
+                <a16:creationId xmlns:a16="http://schemas.microsoft.com/office/drawing/2014/main" id="{EE0C26D2-4C67-4C66-A205-2AD922171FC6}"/>
               </a:ext>
             </a:extLst>
           </p:cNvPr>
@@ -2418,8 +2342,398 @@
         </p:blipFill>
         <p:spPr>
           <a:xfrm>
-            <a:off x="0" y="1232981"/>
-            <a:ext cx="12192000" cy="5014116"/>
+            <a:off x="1462991" y="740539"/>
+            <a:ext cx="9266017" cy="5732999"/>
+          </a:xfrm>
+          <a:prstGeom prst="rect">
+            <a:avLst/>
+          </a:prstGeom>
+        </p:spPr>
+      </p:pic>
+    </p:spTree>
+    <p:extLst>
+      <p:ext uri="{BB962C8B-B14F-4D97-AF65-F5344CB8AC3E}">
+        <p14:creationId xmlns:p14="http://schemas.microsoft.com/office/powerpoint/2010/main" val="2564028869"/>
+      </p:ext>
+    </p:extLst>
+  </p:cSld>
+  <p:clrMapOvr>
+    <a:masterClrMapping/>
+  </p:clrMapOvr>
+</p:sld>
+</file>
+
+<file path=ppt/slides/slide13.xml><?xml version="1.0" encoding="utf-8"?>
+<p:sld xmlns:a="http://schemas.openxmlformats.org/drawingml/2006/main" xmlns:r="http://schemas.openxmlformats.org/officeDocument/2006/relationships" xmlns:p="http://schemas.openxmlformats.org/presentationml/2006/main">
+  <p:cSld>
+    <p:spTree>
+      <p:nvGrpSpPr>
+        <p:cNvPr id="1" name=""/>
+        <p:cNvGrpSpPr/>
+        <p:nvPr/>
+      </p:nvGrpSpPr>
+      <p:grpSpPr>
+        <a:xfrm>
+          <a:off x="0" y="0"/>
+          <a:ext cx="0" cy="0"/>
+          <a:chOff x="0" y="0"/>
+          <a:chExt cx="0" cy="0"/>
+        </a:xfrm>
+      </p:grpSpPr>
+      <p:sp>
+        <p:nvSpPr>
+          <p:cNvPr id="3" name="Title 2">
+            <a:extLst>
+              <a:ext uri="{FF2B5EF4-FFF2-40B4-BE49-F238E27FC236}">
+                <a16:creationId xmlns:a16="http://schemas.microsoft.com/office/drawing/2014/main" id="{170627F4-0651-437F-8C40-B4A905D23F20}"/>
+              </a:ext>
+            </a:extLst>
+          </p:cNvPr>
+          <p:cNvSpPr>
+            <a:spLocks noGrp="1"/>
+          </p:cNvSpPr>
+          <p:nvPr>
+            <p:ph type="title"/>
+          </p:nvPr>
+        </p:nvSpPr>
+        <p:spPr>
+          <a:xfrm>
+            <a:off x="1933596" y="371207"/>
+            <a:ext cx="8324808" cy="984885"/>
+          </a:xfrm>
+        </p:spPr>
+        <p:txBody>
+          <a:bodyPr/>
+          <a:lstStyle/>
+          <a:p>
+            <a:pPr algn="ctr"/>
+            <a:r>
+              <a:rPr lang="en-US" sz="3200" dirty="0">
+                <a:latin typeface="Arial" panose="020B0604020202020204" pitchFamily="34" charset="0"/>
+                <a:cs typeface="Arial" panose="020B0604020202020204" pitchFamily="34" charset="0"/>
+              </a:rPr>
+              <a:t>APD Crime Analysis Unit Districts (Sectors)</a:t>
+            </a:r>
+          </a:p>
+        </p:txBody>
+      </p:sp>
+      <p:sp>
+        <p:nvSpPr>
+          <p:cNvPr id="4" name="Text Placeholder 3">
+            <a:extLst>
+              <a:ext uri="{FF2B5EF4-FFF2-40B4-BE49-F238E27FC236}">
+                <a16:creationId xmlns:a16="http://schemas.microsoft.com/office/drawing/2014/main" id="{871EA759-00CD-42CC-9458-796A844B6AB7}"/>
+              </a:ext>
+            </a:extLst>
+          </p:cNvPr>
+          <p:cNvSpPr>
+            <a:spLocks noGrp="1"/>
+          </p:cNvSpPr>
+          <p:nvPr>
+            <p:ph type="body" idx="1"/>
+          </p:nvPr>
+        </p:nvSpPr>
+        <p:spPr>
+          <a:xfrm>
+            <a:off x="439606" y="1667020"/>
+            <a:ext cx="11115837" cy="3754874"/>
+          </a:xfrm>
+        </p:spPr>
+        <p:txBody>
+          <a:bodyPr/>
+          <a:lstStyle/>
+          <a:p>
+            <a:pPr algn="ctr"/>
+            <a:r>
+              <a:rPr lang="en-US" sz="2400" b="1" u="sng" dirty="0"/>
+              <a:t>Austin, TX is divided into 10 Sectors</a:t>
+            </a:r>
+          </a:p>
+          <a:p>
+            <a:pPr marL="342900" indent="-342900" algn="ctr">
+              <a:buFont typeface="Arial" panose="020B0604020202020204" pitchFamily="34" charset="0"/>
+              <a:buChar char="•"/>
+            </a:pPr>
+            <a:r>
+              <a:rPr lang="en-US" sz="2000" dirty="0"/>
+              <a:t>A – Adam</a:t>
+            </a:r>
+          </a:p>
+          <a:p>
+            <a:pPr marL="342900" indent="-342900" algn="ctr">
+              <a:buFont typeface="Arial" panose="020B0604020202020204" pitchFamily="34" charset="0"/>
+              <a:buChar char="•"/>
+            </a:pPr>
+            <a:r>
+              <a:rPr lang="en-US" sz="2000" dirty="0"/>
+              <a:t>AP - Airport</a:t>
+            </a:r>
+          </a:p>
+          <a:p>
+            <a:pPr marL="342900" indent="-342900" algn="ctr">
+              <a:buFont typeface="Arial" panose="020B0604020202020204" pitchFamily="34" charset="0"/>
+              <a:buChar char="•"/>
+            </a:pPr>
+            <a:r>
+              <a:rPr lang="en-US" sz="2000" dirty="0"/>
+              <a:t>B – Baker</a:t>
+            </a:r>
+          </a:p>
+          <a:p>
+            <a:pPr marL="342900" indent="-342900" algn="ctr">
+              <a:buFont typeface="Arial" panose="020B0604020202020204" pitchFamily="34" charset="0"/>
+              <a:buChar char="•"/>
+            </a:pPr>
+            <a:r>
+              <a:rPr lang="en-US" sz="2000" dirty="0"/>
+              <a:t>C –  Charlie</a:t>
+            </a:r>
+          </a:p>
+          <a:p>
+            <a:pPr marL="342900" indent="-342900" algn="ctr">
+              <a:buFont typeface="Arial" panose="020B0604020202020204" pitchFamily="34" charset="0"/>
+              <a:buChar char="•"/>
+            </a:pPr>
+            <a:r>
+              <a:rPr lang="en-US" sz="2000" dirty="0"/>
+              <a:t>D –  David</a:t>
+            </a:r>
+          </a:p>
+          <a:p>
+            <a:pPr marL="342900" indent="-342900" algn="ctr">
+              <a:buFont typeface="Arial" panose="020B0604020202020204" pitchFamily="34" charset="0"/>
+              <a:buChar char="•"/>
+            </a:pPr>
+            <a:r>
+              <a:rPr lang="en-US" sz="2000" dirty="0"/>
+              <a:t>E –  Edward</a:t>
+            </a:r>
+          </a:p>
+          <a:p>
+            <a:pPr marL="342900" indent="-342900" algn="ctr">
+              <a:buFont typeface="Arial" panose="020B0604020202020204" pitchFamily="34" charset="0"/>
+              <a:buChar char="•"/>
+            </a:pPr>
+            <a:r>
+              <a:rPr lang="en-US" sz="2000" dirty="0"/>
+              <a:t>F – Frank</a:t>
+            </a:r>
+          </a:p>
+          <a:p>
+            <a:pPr marL="342900" indent="-342900" algn="ctr">
+              <a:buFont typeface="Arial" panose="020B0604020202020204" pitchFamily="34" charset="0"/>
+              <a:buChar char="•"/>
+            </a:pPr>
+            <a:r>
+              <a:rPr lang="en-US" sz="2000" dirty="0"/>
+              <a:t>G – George</a:t>
+            </a:r>
+          </a:p>
+          <a:p>
+            <a:pPr marL="342900" indent="-342900" algn="ctr">
+              <a:buFont typeface="Arial" panose="020B0604020202020204" pitchFamily="34" charset="0"/>
+              <a:buChar char="•"/>
+            </a:pPr>
+            <a:r>
+              <a:rPr lang="en-US" sz="2000" dirty="0"/>
+              <a:t>H –  Henry</a:t>
+            </a:r>
+          </a:p>
+          <a:p>
+            <a:pPr marL="342900" indent="-342900" algn="ctr">
+              <a:buFont typeface="Arial" panose="020B0604020202020204" pitchFamily="34" charset="0"/>
+              <a:buChar char="•"/>
+            </a:pPr>
+            <a:r>
+              <a:rPr lang="en-US" sz="2000" dirty="0"/>
+              <a:t>I – IDA</a:t>
+            </a:r>
+          </a:p>
+          <a:p>
+            <a:pPr marL="342900" indent="-342900" algn="l">
+              <a:buFont typeface="Arial" panose="020B0604020202020204" pitchFamily="34" charset="0"/>
+              <a:buChar char="•"/>
+            </a:pPr>
+            <a:endParaRPr lang="en-US" sz="2000" dirty="0"/>
+          </a:p>
+        </p:txBody>
+      </p:sp>
+    </p:spTree>
+    <p:extLst>
+      <p:ext uri="{BB962C8B-B14F-4D97-AF65-F5344CB8AC3E}">
+        <p14:creationId xmlns:p14="http://schemas.microsoft.com/office/powerpoint/2010/main" val="4092120976"/>
+      </p:ext>
+    </p:extLst>
+  </p:cSld>
+  <p:clrMapOvr>
+    <a:masterClrMapping/>
+  </p:clrMapOvr>
+</p:sld>
+</file>
+
+<file path=ppt/slides/slide14.xml><?xml version="1.0" encoding="utf-8"?>
+<p:sld xmlns:a="http://schemas.openxmlformats.org/drawingml/2006/main" xmlns:r="http://schemas.openxmlformats.org/officeDocument/2006/relationships" xmlns:p="http://schemas.openxmlformats.org/presentationml/2006/main">
+  <p:cSld>
+    <p:spTree>
+      <p:nvGrpSpPr>
+        <p:cNvPr id="1" name=""/>
+        <p:cNvGrpSpPr/>
+        <p:nvPr/>
+      </p:nvGrpSpPr>
+      <p:grpSpPr>
+        <a:xfrm>
+          <a:off x="0" y="0"/>
+          <a:ext cx="0" cy="0"/>
+          <a:chOff x="0" y="0"/>
+          <a:chExt cx="0" cy="0"/>
+        </a:xfrm>
+      </p:grpSpPr>
+      <p:pic>
+        <p:nvPicPr>
+          <p:cNvPr id="3" name="Picture 2">
+            <a:extLst>
+              <a:ext uri="{FF2B5EF4-FFF2-40B4-BE49-F238E27FC236}">
+                <a16:creationId xmlns:a16="http://schemas.microsoft.com/office/drawing/2014/main" id="{9B8C41E2-75D1-41A8-B1B5-FFAFDE59C0D2}"/>
+              </a:ext>
+            </a:extLst>
+          </p:cNvPr>
+          <p:cNvPicPr>
+            <a:picLocks noChangeAspect="1"/>
+          </p:cNvPicPr>
+          <p:nvPr/>
+        </p:nvPicPr>
+        <p:blipFill>
+          <a:blip r:embed="rId2">
+            <a:extLst>
+              <a:ext uri="{28A0092B-C50C-407E-A947-70E740481C1C}">
+                <a14:useLocalDpi xmlns:a14="http://schemas.microsoft.com/office/drawing/2010/main" val="0"/>
+              </a:ext>
+            </a:extLst>
+          </a:blip>
+          <a:stretch>
+            <a:fillRect/>
+          </a:stretch>
+        </p:blipFill>
+        <p:spPr>
+          <a:xfrm>
+            <a:off x="3057378" y="251150"/>
+            <a:ext cx="6227299" cy="6206153"/>
+          </a:xfrm>
+          <a:prstGeom prst="rect">
+            <a:avLst/>
+          </a:prstGeom>
+        </p:spPr>
+      </p:pic>
+    </p:spTree>
+    <p:extLst>
+      <p:ext uri="{BB962C8B-B14F-4D97-AF65-F5344CB8AC3E}">
+        <p14:creationId xmlns:p14="http://schemas.microsoft.com/office/powerpoint/2010/main" val="2855204370"/>
+      </p:ext>
+    </p:extLst>
+  </p:cSld>
+  <p:clrMapOvr>
+    <a:masterClrMapping/>
+  </p:clrMapOvr>
+</p:sld>
+</file>
+
+<file path=ppt/slides/slide15.xml><?xml version="1.0" encoding="utf-8"?>
+<p:sld xmlns:a="http://schemas.openxmlformats.org/drawingml/2006/main" xmlns:r="http://schemas.openxmlformats.org/officeDocument/2006/relationships" xmlns:p="http://schemas.openxmlformats.org/presentationml/2006/main">
+  <p:cSld>
+    <p:spTree>
+      <p:nvGrpSpPr>
+        <p:cNvPr id="1" name=""/>
+        <p:cNvGrpSpPr/>
+        <p:nvPr/>
+      </p:nvGrpSpPr>
+      <p:grpSpPr>
+        <a:xfrm>
+          <a:off x="0" y="0"/>
+          <a:ext cx="0" cy="0"/>
+          <a:chOff x="0" y="0"/>
+          <a:chExt cx="0" cy="0"/>
+        </a:xfrm>
+      </p:grpSpPr>
+      <p:sp>
+        <p:nvSpPr>
+          <p:cNvPr id="4" name="Title 3">
+            <a:extLst>
+              <a:ext uri="{FF2B5EF4-FFF2-40B4-BE49-F238E27FC236}">
+                <a16:creationId xmlns:a16="http://schemas.microsoft.com/office/drawing/2014/main" id="{98CED353-7F47-4A61-A462-02BC0D9CFF07}"/>
+              </a:ext>
+            </a:extLst>
+          </p:cNvPr>
+          <p:cNvSpPr>
+            <a:spLocks noGrp="1"/>
+          </p:cNvSpPr>
+          <p:nvPr>
+            <p:ph type="title"/>
+          </p:nvPr>
+        </p:nvSpPr>
+        <p:spPr>
+          <a:xfrm>
+            <a:off x="1933596" y="371207"/>
+            <a:ext cx="8324808" cy="800219"/>
+          </a:xfrm>
+        </p:spPr>
+        <p:txBody>
+          <a:bodyPr/>
+          <a:lstStyle/>
+          <a:p>
+            <a:pPr algn="ctr"/>
+            <a:r>
+              <a:rPr lang="en-US" sz="2400" dirty="0">
+                <a:latin typeface="Arial" panose="020B0604020202020204" pitchFamily="34" charset="0"/>
+                <a:cs typeface="Arial" panose="020B0604020202020204" pitchFamily="34" charset="0"/>
+              </a:rPr>
+              <a:t>Incidents Based on District Per 100,000 Inhabitants</a:t>
+            </a:r>
+            <a:br>
+              <a:rPr lang="en-US" sz="2800" dirty="0">
+                <a:latin typeface="Arial" panose="020B0604020202020204" pitchFamily="34" charset="0"/>
+                <a:cs typeface="Arial" panose="020B0604020202020204" pitchFamily="34" charset="0"/>
+              </a:rPr>
+            </a:br>
+            <a:r>
+              <a:rPr lang="en-US" sz="2800" dirty="0">
+                <a:latin typeface="Arial" panose="020B0604020202020204" pitchFamily="34" charset="0"/>
+                <a:cs typeface="Arial" panose="020B0604020202020204" pitchFamily="34" charset="0"/>
+              </a:rPr>
+              <a:t>2014</a:t>
+            </a:r>
+          </a:p>
+        </p:txBody>
+      </p:sp>
+      <p:pic>
+        <p:nvPicPr>
+          <p:cNvPr id="7" name="Picture 6">
+            <a:extLst>
+              <a:ext uri="{FF2B5EF4-FFF2-40B4-BE49-F238E27FC236}">
+                <a16:creationId xmlns:a16="http://schemas.microsoft.com/office/drawing/2014/main" id="{788A63A8-9A2A-43A3-A449-05521BACB8FA}"/>
+              </a:ext>
+            </a:extLst>
+          </p:cNvPr>
+          <p:cNvPicPr>
+            <a:picLocks noChangeAspect="1"/>
+          </p:cNvPicPr>
+          <p:nvPr/>
+        </p:nvPicPr>
+        <p:blipFill>
+          <a:blip r:embed="rId2">
+            <a:extLst>
+              <a:ext uri="{28A0092B-C50C-407E-A947-70E740481C1C}">
+                <a14:useLocalDpi xmlns:a14="http://schemas.microsoft.com/office/drawing/2010/main" val="0"/>
+              </a:ext>
+            </a:extLst>
+          </a:blip>
+          <a:stretch>
+            <a:fillRect/>
+          </a:stretch>
+        </p:blipFill>
+        <p:spPr>
+          <a:xfrm>
+            <a:off x="2445846" y="1171426"/>
+            <a:ext cx="6478673" cy="4792896"/>
           </a:xfrm>
           <a:prstGeom prst="rect">
             <a:avLst/>
@@ -2439,7 +2753,241 @@
 </p:sld>
 </file>
 
-<file path=ppt/slides/slide13.xml><?xml version="1.0" encoding="utf-8"?>
+<file path=ppt/slides/slide16.xml><?xml version="1.0" encoding="utf-8"?>
+<p:sld xmlns:a="http://schemas.openxmlformats.org/drawingml/2006/main" xmlns:r="http://schemas.openxmlformats.org/officeDocument/2006/relationships" xmlns:p="http://schemas.openxmlformats.org/presentationml/2006/main">
+  <p:cSld>
+    <p:spTree>
+      <p:nvGrpSpPr>
+        <p:cNvPr id="1" name=""/>
+        <p:cNvGrpSpPr/>
+        <p:nvPr/>
+      </p:nvGrpSpPr>
+      <p:grpSpPr>
+        <a:xfrm>
+          <a:off x="0" y="0"/>
+          <a:ext cx="0" cy="0"/>
+          <a:chOff x="0" y="0"/>
+          <a:chExt cx="0" cy="0"/>
+        </a:xfrm>
+      </p:grpSpPr>
+      <p:sp>
+        <p:nvSpPr>
+          <p:cNvPr id="2" name="Title 1">
+            <a:extLst>
+              <a:ext uri="{FF2B5EF4-FFF2-40B4-BE49-F238E27FC236}">
+                <a16:creationId xmlns:a16="http://schemas.microsoft.com/office/drawing/2014/main" id="{42BD2A7F-D9DD-4599-AF3F-69D2EAE7267A}"/>
+              </a:ext>
+            </a:extLst>
+          </p:cNvPr>
+          <p:cNvSpPr>
+            <a:spLocks noGrp="1"/>
+          </p:cNvSpPr>
+          <p:nvPr>
+            <p:ph type="title"/>
+          </p:nvPr>
+        </p:nvSpPr>
+        <p:spPr>
+          <a:xfrm>
+            <a:off x="1933596" y="371207"/>
+            <a:ext cx="8324808" cy="677108"/>
+          </a:xfrm>
+        </p:spPr>
+        <p:txBody>
+          <a:bodyPr/>
+          <a:lstStyle/>
+          <a:p>
+            <a:pPr algn="ctr"/>
+            <a:r>
+              <a:rPr lang="en-US" sz="2000" dirty="0">
+                <a:latin typeface="Arial" panose="020B0604020202020204" pitchFamily="34" charset="0"/>
+                <a:cs typeface="Arial" panose="020B0604020202020204" pitchFamily="34" charset="0"/>
+              </a:rPr>
+              <a:t>Incidents Based on District Per 100,000 Inhabitants</a:t>
+            </a:r>
+            <a:br>
+              <a:rPr lang="en-US" sz="2400" dirty="0">
+                <a:latin typeface="Arial" panose="020B0604020202020204" pitchFamily="34" charset="0"/>
+                <a:cs typeface="Arial" panose="020B0604020202020204" pitchFamily="34" charset="0"/>
+              </a:rPr>
+            </a:br>
+            <a:r>
+              <a:rPr lang="en-US" sz="2400" dirty="0">
+                <a:latin typeface="Arial" panose="020B0604020202020204" pitchFamily="34" charset="0"/>
+                <a:cs typeface="Arial" panose="020B0604020202020204" pitchFamily="34" charset="0"/>
+              </a:rPr>
+              <a:t>2015</a:t>
+            </a:r>
+            <a:endParaRPr lang="en-US" dirty="0"/>
+          </a:p>
+        </p:txBody>
+      </p:sp>
+      <p:pic>
+        <p:nvPicPr>
+          <p:cNvPr id="5" name="Picture 4">
+            <a:extLst>
+              <a:ext uri="{FF2B5EF4-FFF2-40B4-BE49-F238E27FC236}">
+                <a16:creationId xmlns:a16="http://schemas.microsoft.com/office/drawing/2014/main" id="{CDFCB2A2-EBF2-469F-ADD8-F3803205A68C}"/>
+              </a:ext>
+            </a:extLst>
+          </p:cNvPr>
+          <p:cNvPicPr>
+            <a:picLocks noChangeAspect="1"/>
+          </p:cNvPicPr>
+          <p:nvPr/>
+        </p:nvPicPr>
+        <p:blipFill>
+          <a:blip r:embed="rId2">
+            <a:extLst>
+              <a:ext uri="{28A0092B-C50C-407E-A947-70E740481C1C}">
+                <a14:useLocalDpi xmlns:a14="http://schemas.microsoft.com/office/drawing/2010/main" val="0"/>
+              </a:ext>
+            </a:extLst>
+          </a:blip>
+          <a:stretch>
+            <a:fillRect/>
+          </a:stretch>
+        </p:blipFill>
+        <p:spPr>
+          <a:xfrm>
+            <a:off x="2493049" y="1145297"/>
+            <a:ext cx="6405371" cy="4738668"/>
+          </a:xfrm>
+          <a:prstGeom prst="rect">
+            <a:avLst/>
+          </a:prstGeom>
+        </p:spPr>
+      </p:pic>
+    </p:spTree>
+    <p:extLst>
+      <p:ext uri="{BB962C8B-B14F-4D97-AF65-F5344CB8AC3E}">
+        <p14:creationId xmlns:p14="http://schemas.microsoft.com/office/powerpoint/2010/main" val="1085323051"/>
+      </p:ext>
+    </p:extLst>
+  </p:cSld>
+  <p:clrMapOvr>
+    <a:masterClrMapping/>
+  </p:clrMapOvr>
+</p:sld>
+</file>
+
+<file path=ppt/slides/slide17.xml><?xml version="1.0" encoding="utf-8"?>
+<p:sld xmlns:a="http://schemas.openxmlformats.org/drawingml/2006/main" xmlns:r="http://schemas.openxmlformats.org/officeDocument/2006/relationships" xmlns:p="http://schemas.openxmlformats.org/presentationml/2006/main">
+  <p:cSld>
+    <p:spTree>
+      <p:nvGrpSpPr>
+        <p:cNvPr id="1" name=""/>
+        <p:cNvGrpSpPr/>
+        <p:nvPr/>
+      </p:nvGrpSpPr>
+      <p:grpSpPr>
+        <a:xfrm>
+          <a:off x="0" y="0"/>
+          <a:ext cx="0" cy="0"/>
+          <a:chOff x="0" y="0"/>
+          <a:chExt cx="0" cy="0"/>
+        </a:xfrm>
+      </p:grpSpPr>
+      <p:sp>
+        <p:nvSpPr>
+          <p:cNvPr id="5" name="Title 4">
+            <a:extLst>
+              <a:ext uri="{FF2B5EF4-FFF2-40B4-BE49-F238E27FC236}">
+                <a16:creationId xmlns:a16="http://schemas.microsoft.com/office/drawing/2014/main" id="{10BF2A33-EF62-4F5D-BBB0-E48282B41551}"/>
+              </a:ext>
+            </a:extLst>
+          </p:cNvPr>
+          <p:cNvSpPr>
+            <a:spLocks noGrp="1"/>
+          </p:cNvSpPr>
+          <p:nvPr>
+            <p:ph type="title"/>
+          </p:nvPr>
+        </p:nvSpPr>
+        <p:spPr>
+          <a:xfrm>
+            <a:off x="1933596" y="371207"/>
+            <a:ext cx="8324808" cy="677108"/>
+          </a:xfrm>
+        </p:spPr>
+        <p:txBody>
+          <a:bodyPr/>
+          <a:lstStyle/>
+          <a:p>
+            <a:pPr algn="ctr"/>
+            <a:r>
+              <a:rPr lang="en-US" sz="2000" dirty="0">
+                <a:latin typeface="Arial" panose="020B0604020202020204" pitchFamily="34" charset="0"/>
+                <a:cs typeface="Arial" panose="020B0604020202020204" pitchFamily="34" charset="0"/>
+              </a:rPr>
+              <a:t>Incidents Based on District Per 100,000 Inhabitants</a:t>
+            </a:r>
+            <a:br>
+              <a:rPr lang="en-US" sz="2400" dirty="0">
+                <a:latin typeface="Arial" panose="020B0604020202020204" pitchFamily="34" charset="0"/>
+                <a:cs typeface="Arial" panose="020B0604020202020204" pitchFamily="34" charset="0"/>
+              </a:rPr>
+            </a:br>
+            <a:r>
+              <a:rPr lang="en-US" sz="2400" dirty="0">
+                <a:latin typeface="Arial" panose="020B0604020202020204" pitchFamily="34" charset="0"/>
+                <a:cs typeface="Arial" panose="020B0604020202020204" pitchFamily="34" charset="0"/>
+              </a:rPr>
+              <a:t>2016</a:t>
+            </a:r>
+            <a:endParaRPr lang="en-US" sz="2400" dirty="0"/>
+          </a:p>
+        </p:txBody>
+      </p:sp>
+      <p:pic>
+        <p:nvPicPr>
+          <p:cNvPr id="8" name="Picture 7">
+            <a:extLst>
+              <a:ext uri="{FF2B5EF4-FFF2-40B4-BE49-F238E27FC236}">
+                <a16:creationId xmlns:a16="http://schemas.microsoft.com/office/drawing/2014/main" id="{D37C5033-3B68-4F2C-9565-0DF79A81EC9C}"/>
+              </a:ext>
+            </a:extLst>
+          </p:cNvPr>
+          <p:cNvPicPr>
+            <a:picLocks noChangeAspect="1"/>
+          </p:cNvPicPr>
+          <p:nvPr/>
+        </p:nvPicPr>
+        <p:blipFill>
+          <a:blip r:embed="rId2">
+            <a:extLst>
+              <a:ext uri="{28A0092B-C50C-407E-A947-70E740481C1C}">
+                <a14:useLocalDpi xmlns:a14="http://schemas.microsoft.com/office/drawing/2010/main" val="0"/>
+              </a:ext>
+            </a:extLst>
+          </a:blip>
+          <a:stretch>
+            <a:fillRect/>
+          </a:stretch>
+        </p:blipFill>
+        <p:spPr>
+          <a:xfrm>
+            <a:off x="2400284" y="1141080"/>
+            <a:ext cx="6531681" cy="4832111"/>
+          </a:xfrm>
+          <a:prstGeom prst="rect">
+            <a:avLst/>
+          </a:prstGeom>
+        </p:spPr>
+      </p:pic>
+    </p:spTree>
+    <p:extLst>
+      <p:ext uri="{BB962C8B-B14F-4D97-AF65-F5344CB8AC3E}">
+        <p14:creationId xmlns:p14="http://schemas.microsoft.com/office/powerpoint/2010/main" val="493510471"/>
+      </p:ext>
+    </p:extLst>
+  </p:cSld>
+  <p:clrMapOvr>
+    <a:masterClrMapping/>
+  </p:clrMapOvr>
+</p:sld>
+</file>
+
+<file path=ppt/slides/slide18.xml><?xml version="1.0" encoding="utf-8"?>
 <p:sld xmlns:a="http://schemas.openxmlformats.org/drawingml/2006/main" xmlns:r="http://schemas.openxmlformats.org/officeDocument/2006/relationships" xmlns:p="http://schemas.openxmlformats.org/presentationml/2006/main">
   <p:cSld>
     <p:spTree>
@@ -2688,7 +3236,7 @@
             </a:pPr>
             <a:r>
               <a:rPr lang="en-US" sz="2000" dirty="0"/>
-              <a:t>Which incident types occurred most frequently</a:t>
+              <a:t>How safe do we feel living in this city</a:t>
             </a:r>
           </a:p>
           <a:p>
@@ -2698,7 +3246,7 @@
             </a:pPr>
             <a:r>
               <a:rPr lang="en-US" sz="2000" dirty="0"/>
-              <a:t>How safe do we feel living in this city</a:t>
+              <a:t>Which incident types occurred most frequently</a:t>
             </a:r>
           </a:p>
           <a:p>
@@ -3445,10 +3993,10 @@
       </p:grpSpPr>
       <p:sp>
         <p:nvSpPr>
-          <p:cNvPr id="2" name="Title 1">
+          <p:cNvPr id="4" name="Title 3">
             <a:extLst>
               <a:ext uri="{FF2B5EF4-FFF2-40B4-BE49-F238E27FC236}">
-                <a16:creationId xmlns:a16="http://schemas.microsoft.com/office/drawing/2014/main" id="{8D9A8724-4A99-401A-B94A-2D08F6CA369B}"/>
+                <a16:creationId xmlns:a16="http://schemas.microsoft.com/office/drawing/2014/main" id="{31519744-D237-4F24-B812-8853A9CDE39F}"/>
               </a:ext>
             </a:extLst>
           </p:cNvPr>
@@ -3461,8 +4009,8 @@
         </p:nvSpPr>
         <p:spPr>
           <a:xfrm>
-            <a:off x="290327" y="397711"/>
-            <a:ext cx="8324808" cy="276999"/>
+            <a:off x="1933596" y="371207"/>
+            <a:ext cx="8324808" cy="369332"/>
           </a:xfrm>
         </p:spPr>
         <p:txBody>
@@ -3470,22 +4018,21 @@
           <a:lstStyle/>
           <a:p>
             <a:r>
-              <a:rPr lang="en-US" sz="1800" dirty="0">
+              <a:rPr lang="en-US" sz="2400" dirty="0">
                 <a:latin typeface="Arial" panose="020B0604020202020204" pitchFamily="34" charset="0"/>
                 <a:cs typeface="Arial" panose="020B0604020202020204" pitchFamily="34" charset="0"/>
               </a:rPr>
-              <a:t>Crime Incidents by Month 2015</a:t>
-            </a:r>
-            <a:endParaRPr lang="en-US" sz="1800" dirty="0"/>
+              <a:t>Crime Incidents by Month per 100,000 Inhabitants 2014</a:t>
+            </a:r>
           </a:p>
         </p:txBody>
       </p:sp>
       <p:pic>
         <p:nvPicPr>
-          <p:cNvPr id="4" name="Picture 3">
+          <p:cNvPr id="7" name="Picture 6">
             <a:extLst>
               <a:ext uri="{FF2B5EF4-FFF2-40B4-BE49-F238E27FC236}">
-                <a16:creationId xmlns:a16="http://schemas.microsoft.com/office/drawing/2014/main" id="{C5A2DC85-5DF7-49E3-A8C9-A9CCC48DD540}"/>
+                <a16:creationId xmlns:a16="http://schemas.microsoft.com/office/drawing/2014/main" id="{214AF4CF-4D6D-4780-8B87-94CFA671A9C3}"/>
               </a:ext>
             </a:extLst>
           </p:cNvPr>
@@ -3508,8 +4055,8 @@
         </p:blipFill>
         <p:spPr>
           <a:xfrm>
-            <a:off x="1277602" y="324606"/>
-            <a:ext cx="9072348" cy="6135683"/>
+            <a:off x="1622015" y="950577"/>
+            <a:ext cx="8947965" cy="5536216"/>
           </a:xfrm>
           <a:prstGeom prst="rect">
             <a:avLst/>
@@ -3519,7 +4066,7 @@
     </p:spTree>
     <p:extLst>
       <p:ext uri="{BB962C8B-B14F-4D97-AF65-F5344CB8AC3E}">
-        <p14:creationId xmlns:p14="http://schemas.microsoft.com/office/powerpoint/2010/main" val="1826920338"/>
+        <p14:creationId xmlns:p14="http://schemas.microsoft.com/office/powerpoint/2010/main" val="3451077177"/>
       </p:ext>
     </p:extLst>
   </p:cSld>
@@ -3551,7 +4098,7 @@
           <p:cNvPr id="2" name="Title 1">
             <a:extLst>
               <a:ext uri="{FF2B5EF4-FFF2-40B4-BE49-F238E27FC236}">
-                <a16:creationId xmlns:a16="http://schemas.microsoft.com/office/drawing/2014/main" id="{BCC68EBE-2ABA-4657-AB0E-302D1046CC9B}"/>
+                <a16:creationId xmlns:a16="http://schemas.microsoft.com/office/drawing/2014/main" id="{8D9A8724-4A99-401A-B94A-2D08F6CA369B}"/>
               </a:ext>
             </a:extLst>
           </p:cNvPr>
@@ -3564,7 +4111,7 @@
         </p:nvSpPr>
         <p:spPr>
           <a:xfrm>
-            <a:off x="250570" y="331451"/>
+            <a:off x="290327" y="397711"/>
             <a:ext cx="8324808" cy="276999"/>
           </a:xfrm>
         </p:spPr>
@@ -3577,7 +4124,7 @@
                 <a:latin typeface="Arial" panose="020B0604020202020204" pitchFamily="34" charset="0"/>
                 <a:cs typeface="Arial" panose="020B0604020202020204" pitchFamily="34" charset="0"/>
               </a:rPr>
-              <a:t>Crime Incidents by Month 2016</a:t>
+              <a:t>Crime Incidents by Month 2015</a:t>
             </a:r>
             <a:endParaRPr lang="en-US" sz="1800" dirty="0"/>
           </a:p>
@@ -3588,7 +4135,7 @@
           <p:cNvPr id="4" name="Picture 3">
             <a:extLst>
               <a:ext uri="{FF2B5EF4-FFF2-40B4-BE49-F238E27FC236}">
-                <a16:creationId xmlns:a16="http://schemas.microsoft.com/office/drawing/2014/main" id="{7AE8BA13-F6A7-4D84-BA52-6CC32B78F0EB}"/>
+                <a16:creationId xmlns:a16="http://schemas.microsoft.com/office/drawing/2014/main" id="{C5A2DC85-5DF7-49E3-A8C9-A9CCC48DD540}"/>
               </a:ext>
             </a:extLst>
           </p:cNvPr>
@@ -3611,8 +4158,8 @@
         </p:blipFill>
         <p:spPr>
           <a:xfrm>
-            <a:off x="1092072" y="399830"/>
-            <a:ext cx="9059094" cy="6126719"/>
+            <a:off x="1277602" y="324606"/>
+            <a:ext cx="9072348" cy="6135683"/>
           </a:xfrm>
           <a:prstGeom prst="rect">
             <a:avLst/>
@@ -3622,7 +4169,7 @@
     </p:spTree>
     <p:extLst>
       <p:ext uri="{BB962C8B-B14F-4D97-AF65-F5344CB8AC3E}">
-        <p14:creationId xmlns:p14="http://schemas.microsoft.com/office/powerpoint/2010/main" val="55347818"/>
+        <p14:creationId xmlns:p14="http://schemas.microsoft.com/office/powerpoint/2010/main" val="1826920338"/>
       </p:ext>
     </p:extLst>
   </p:cSld>

</xml_diff>